<commit_message>
Initial Project Report Update
Initial Project Report Update
</commit_message>
<xml_diff>
--- a/RTS_InitialProjectReport.pptx
+++ b/RTS_InitialProjectReport.pptx
@@ -5,15 +5,16 @@
     <p:sldMasterId id="2147483854" r:id="rId1"/>
   </p:sldMasterIdLst>
   <p:notesMasterIdLst>
-    <p:notesMasterId r:id="rId8"/>
+    <p:notesMasterId r:id="rId9"/>
   </p:notesMasterIdLst>
   <p:sldIdLst>
     <p:sldId id="256" r:id="rId2"/>
     <p:sldId id="258" r:id="rId3"/>
     <p:sldId id="261" r:id="rId4"/>
-    <p:sldId id="259" r:id="rId5"/>
-    <p:sldId id="260" r:id="rId6"/>
-    <p:sldId id="262" r:id="rId7"/>
+    <p:sldId id="263" r:id="rId5"/>
+    <p:sldId id="259" r:id="rId6"/>
+    <p:sldId id="260" r:id="rId7"/>
+    <p:sldId id="262" r:id="rId8"/>
   </p:sldIdLst>
   <p:sldSz cx="12192000" cy="6858000"/>
   <p:notesSz cx="6858000" cy="9144000"/>
@@ -202,7 +203,7 @@
           <a:p>
             <a:fld id="{266DAC16-DA02-F847-8D55-44345BC3D9A5}" type="datetimeFigureOut">
               <a:rPr lang="de-DE" smtClean="0"/>
-              <a:t>13.05.20</a:t>
+              <a:t>15.05.20</a:t>
             </a:fld>
             <a:endParaRPr lang="de-DE"/>
           </a:p>
@@ -601,7 +602,7 @@
           <a:p>
             <a:fld id="{8B80C8B8-B73E-8B47-9E48-221C3F590C28}" type="datetime1">
               <a:rPr lang="de-DE" smtClean="0"/>
-              <a:t>13.05.20</a:t>
+              <a:t>15.05.20</a:t>
             </a:fld>
             <a:endParaRPr lang="de-DE"/>
           </a:p>
@@ -771,7 +772,7 @@
           <a:p>
             <a:fld id="{93C37B03-4513-A141-9022-E9824DCBB0A0}" type="datetime1">
               <a:rPr lang="de-DE" smtClean="0"/>
-              <a:t>13.05.20</a:t>
+              <a:t>15.05.20</a:t>
             </a:fld>
             <a:endParaRPr lang="de-DE"/>
           </a:p>
@@ -951,7 +952,7 @@
           <a:p>
             <a:fld id="{FF214724-919D-3A48-917F-8917AAF14B3A}" type="datetime1">
               <a:rPr lang="de-DE" smtClean="0"/>
-              <a:t>13.05.20</a:t>
+              <a:t>15.05.20</a:t>
             </a:fld>
             <a:endParaRPr lang="de-DE"/>
           </a:p>
@@ -1121,7 +1122,7 @@
           <a:p>
             <a:fld id="{982A8D32-BB74-954F-ACFF-87E57C5AC28A}" type="datetime1">
               <a:rPr lang="de-DE" smtClean="0"/>
-              <a:t>13.05.20</a:t>
+              <a:t>15.05.20</a:t>
             </a:fld>
             <a:endParaRPr lang="de-DE"/>
           </a:p>
@@ -1367,7 +1368,7 @@
           <a:p>
             <a:fld id="{E46E76CB-6BB4-DA4C-B48D-169919057F8A}" type="datetime1">
               <a:rPr lang="de-DE" smtClean="0"/>
-              <a:t>13.05.20</a:t>
+              <a:t>15.05.20</a:t>
             </a:fld>
             <a:endParaRPr lang="de-DE"/>
           </a:p>
@@ -1599,7 +1600,7 @@
           <a:p>
             <a:fld id="{F55CE61A-5631-AE44-8294-14E7692462B8}" type="datetime1">
               <a:rPr lang="de-DE" smtClean="0"/>
-              <a:t>13.05.20</a:t>
+              <a:t>15.05.20</a:t>
             </a:fld>
             <a:endParaRPr lang="de-DE"/>
           </a:p>
@@ -1966,7 +1967,7 @@
           <a:p>
             <a:fld id="{77641EFC-DD41-024F-AF86-EE6616483216}" type="datetime1">
               <a:rPr lang="de-DE" smtClean="0"/>
-              <a:t>13.05.20</a:t>
+              <a:t>15.05.20</a:t>
             </a:fld>
             <a:endParaRPr lang="de-DE"/>
           </a:p>
@@ -2084,7 +2085,7 @@
           <a:p>
             <a:fld id="{390441C9-2726-8849-B1B3-1ACF09CA1DD5}" type="datetime1">
               <a:rPr lang="de-DE" smtClean="0"/>
-              <a:t>13.05.20</a:t>
+              <a:t>15.05.20</a:t>
             </a:fld>
             <a:endParaRPr lang="de-DE"/>
           </a:p>
@@ -2179,7 +2180,7 @@
           <a:p>
             <a:fld id="{58DD452A-2813-4646-AD19-8C4B9CDAB8F3}" type="datetime1">
               <a:rPr lang="de-DE" smtClean="0"/>
-              <a:t>13.05.20</a:t>
+              <a:t>15.05.20</a:t>
             </a:fld>
             <a:endParaRPr lang="de-DE"/>
           </a:p>
@@ -2456,7 +2457,7 @@
           <a:p>
             <a:fld id="{6BF90A40-5018-E844-AE4D-A04427B8A67D}" type="datetime1">
               <a:rPr lang="de-DE" smtClean="0"/>
-              <a:t>13.05.20</a:t>
+              <a:t>15.05.20</a:t>
             </a:fld>
             <a:endParaRPr lang="de-DE"/>
           </a:p>
@@ -2713,7 +2714,7 @@
           <a:p>
             <a:fld id="{B39CFF23-CD56-C845-9F00-3DA42EF60425}" type="datetime1">
               <a:rPr lang="de-DE" smtClean="0"/>
-              <a:t>13.05.20</a:t>
+              <a:t>15.05.20</a:t>
             </a:fld>
             <a:endParaRPr lang="de-DE"/>
           </a:p>
@@ -2953,7 +2954,7 @@
           <a:p>
             <a:fld id="{CCBDBEBC-F268-6843-9BFF-885A5F68C54F}" type="datetime1">
               <a:rPr lang="de-DE" smtClean="0"/>
-              <a:t>13.05.20</a:t>
+              <a:t>15.05.20</a:t>
             </a:fld>
             <a:endParaRPr lang="de-DE"/>
           </a:p>
@@ -3585,7 +3586,7 @@
             <a:pPr algn="ctr"/>
             <a:r>
               <a:rPr lang="en-US" dirty="0"/>
-              <a:t>Project Description</a:t>
+              <a:t>Project Introduction</a:t>
             </a:r>
           </a:p>
         </p:txBody>
@@ -3606,32 +3607,21 @@
             <p:ph idx="1"/>
           </p:nvPr>
         </p:nvSpPr>
-        <p:spPr/>
-        <p:txBody>
-          <a:bodyPr/>
+        <p:spPr>
+          <a:xfrm>
+            <a:off x="838200" y="1690688"/>
+            <a:ext cx="10515600" cy="4486275"/>
+          </a:xfrm>
+        </p:spPr>
+        <p:txBody>
+          <a:bodyPr>
+            <a:normAutofit/>
+          </a:bodyPr>
           <a:lstStyle/>
           <a:p>
             <a:r>
               <a:rPr lang="en-US" dirty="0"/>
-              <a:t>Abstract</a:t>
-            </a:r>
-          </a:p>
-          <a:p>
-            <a:r>
-              <a:rPr lang="en-US" dirty="0"/>
-              <a:t>Design and Implementation(Real time aspects) - MVC</a:t>
-            </a:r>
-          </a:p>
-          <a:p>
-            <a:r>
-              <a:rPr lang="en-US" dirty="0"/>
-              <a:t>Features(Graphical view, multiple algorithms, timeline execution, types of input and output) </a:t>
-            </a:r>
-          </a:p>
-          <a:p>
-            <a:r>
-              <a:rPr lang="en-US" dirty="0"/>
-              <a:t>Technologies used</a:t>
+              <a:t>Scheduling is the decision on how the processes are assigned to run on available CPU(s). The objective of this project is to design and implement a simulator for real-time scheduling algorithms and display the behavior of such algorithms based on predefined task set. The following algorithms can be simulated: .....</a:t>
             </a:r>
           </a:p>
           <a:p>
@@ -3639,9 +3629,6 @@
               <a:rPr lang="en-US" dirty="0"/>
               <a:t>V- model (Confirm with professor)</a:t>
             </a:r>
-          </a:p>
-          <a:p>
-            <a:endParaRPr lang="en-US" dirty="0"/>
           </a:p>
         </p:txBody>
       </p:sp>
@@ -3742,35 +3729,6 @@
       </p:grpSpPr>
       <p:sp>
         <p:nvSpPr>
-          <p:cNvPr id="2" name="Title 1">
-            <a:extLst>
-              <a:ext uri="{FF2B5EF4-FFF2-40B4-BE49-F238E27FC236}">
-                <a16:creationId xmlns:a16="http://schemas.microsoft.com/office/drawing/2014/main" id="{D4858DAF-249F-5148-9CF1-E8D24A5F7E28}"/>
-              </a:ext>
-            </a:extLst>
-          </p:cNvPr>
-          <p:cNvSpPr>
-            <a:spLocks noGrp="1"/>
-          </p:cNvSpPr>
-          <p:nvPr>
-            <p:ph type="title"/>
-          </p:nvPr>
-        </p:nvSpPr>
-        <p:spPr/>
-        <p:txBody>
-          <a:bodyPr/>
-          <a:lstStyle/>
-          <a:p>
-            <a:pPr algn="ctr"/>
-            <a:r>
-              <a:rPr lang="en-US" dirty="0"/>
-              <a:t>Project Description</a:t>
-            </a:r>
-          </a:p>
-        </p:txBody>
-      </p:sp>
-      <p:sp>
-        <p:nvSpPr>
           <p:cNvPr id="3" name="Content Placeholder 2">
             <a:extLst>
               <a:ext uri="{FF2B5EF4-FFF2-40B4-BE49-F238E27FC236}">
@@ -3785,11 +3743,69 @@
             <p:ph idx="1"/>
           </p:nvPr>
         </p:nvSpPr>
-        <p:spPr/>
-        <p:txBody>
-          <a:bodyPr/>
-          <a:lstStyle/>
-          <a:p>
+        <p:spPr>
+          <a:xfrm>
+            <a:off x="838200" y="1122363"/>
+            <a:ext cx="10515600" cy="5054600"/>
+          </a:xfrm>
+        </p:spPr>
+        <p:txBody>
+          <a:bodyPr/>
+          <a:lstStyle/>
+          <a:p>
+            <a:r>
+              <a:rPr lang="en-US" dirty="0"/>
+              <a:t>The simulator includes the following:</a:t>
+            </a:r>
+          </a:p>
+          <a:p>
+            <a:pPr lvl="1"/>
+            <a:r>
+              <a:rPr lang="en-US" dirty="0"/>
+              <a:t>Multiple forms of input(.txt, .csv, .</a:t>
+            </a:r>
+            <a:r>
+              <a:rPr lang="en-US" dirty="0" err="1"/>
+              <a:t>xls</a:t>
+            </a:r>
+            <a:r>
+              <a:rPr lang="en-US" dirty="0"/>
+              <a:t> and via on screen input)</a:t>
+            </a:r>
+          </a:p>
+          <a:p>
+            <a:pPr lvl="1"/>
+            <a:r>
+              <a:rPr lang="en-US" dirty="0"/>
+              <a:t>Output in the form of graphical representation and numerical data</a:t>
+            </a:r>
+          </a:p>
+          <a:p>
+            <a:pPr lvl="1"/>
+            <a:r>
+              <a:rPr lang="en-US" dirty="0"/>
+              <a:t>Option to choose the desired scheduling algorithm for simulation</a:t>
+            </a:r>
+          </a:p>
+          <a:p>
+            <a:pPr lvl="1"/>
+            <a:r>
+              <a:rPr lang="en-US" dirty="0"/>
+              <a:t>Compare output of multiple algorithms</a:t>
+            </a:r>
+          </a:p>
+          <a:p>
+            <a:r>
+              <a:rPr lang="en-US" dirty="0"/>
+              <a:t>Technologies Used: Django Framework.</a:t>
+            </a:r>
+          </a:p>
+          <a:p>
+            <a:pPr lvl="1"/>
+            <a:endParaRPr lang="en-US" dirty="0"/>
+          </a:p>
+          <a:p>
+            <a:pPr lvl="1"/>
             <a:endParaRPr lang="en-US" dirty="0"/>
           </a:p>
         </p:txBody>
@@ -3894,6 +3910,230 @@
           <p:cNvPr id="2" name="Title 1">
             <a:extLst>
               <a:ext uri="{FF2B5EF4-FFF2-40B4-BE49-F238E27FC236}">
+                <a16:creationId xmlns:a16="http://schemas.microsoft.com/office/drawing/2014/main" id="{CECB3D77-B993-594A-BBAF-477AD1BC8004}"/>
+              </a:ext>
+            </a:extLst>
+          </p:cNvPr>
+          <p:cNvSpPr>
+            <a:spLocks noGrp="1"/>
+          </p:cNvSpPr>
+          <p:nvPr>
+            <p:ph type="title"/>
+          </p:nvPr>
+        </p:nvSpPr>
+        <p:spPr>
+          <a:xfrm>
+            <a:off x="838200" y="365125"/>
+            <a:ext cx="10515600" cy="623703"/>
+          </a:xfrm>
+        </p:spPr>
+        <p:txBody>
+          <a:bodyPr>
+            <a:normAutofit fontScale="90000"/>
+          </a:bodyPr>
+          <a:lstStyle/>
+          <a:p>
+            <a:r>
+              <a:rPr lang="en-US" dirty="0"/>
+              <a:t>Design:</a:t>
+            </a:r>
+          </a:p>
+        </p:txBody>
+      </p:sp>
+      <p:pic>
+        <p:nvPicPr>
+          <p:cNvPr id="6" name="Content Placeholder 5" descr="A picture containing flower&#10;&#10;Description automatically generated">
+            <a:extLst>
+              <a:ext uri="{FF2B5EF4-FFF2-40B4-BE49-F238E27FC236}">
+                <a16:creationId xmlns:a16="http://schemas.microsoft.com/office/drawing/2014/main" id="{474AC406-DB2E-0A4D-B195-6E7AA9C2EE1B}"/>
+              </a:ext>
+            </a:extLst>
+          </p:cNvPr>
+          <p:cNvPicPr>
+            <a:picLocks noGrp="1" noChangeAspect="1"/>
+          </p:cNvPicPr>
+          <p:nvPr>
+            <p:ph idx="1"/>
+          </p:nvPr>
+        </p:nvPicPr>
+        <p:blipFill>
+          <a:blip r:embed="rId2"/>
+          <a:stretch>
+            <a:fillRect/>
+          </a:stretch>
+        </p:blipFill>
+        <p:spPr>
+          <a:xfrm>
+            <a:off x="532662" y="2326828"/>
+            <a:ext cx="6235700" cy="3238500"/>
+          </a:xfrm>
+        </p:spPr>
+      </p:pic>
+      <p:sp>
+        <p:nvSpPr>
+          <p:cNvPr id="4" name="Slide Number Placeholder 3">
+            <a:extLst>
+              <a:ext uri="{FF2B5EF4-FFF2-40B4-BE49-F238E27FC236}">
+                <a16:creationId xmlns:a16="http://schemas.microsoft.com/office/drawing/2014/main" id="{325043BE-6662-3443-AE6C-6BB8C578F96A}"/>
+              </a:ext>
+            </a:extLst>
+          </p:cNvPr>
+          <p:cNvSpPr>
+            <a:spLocks noGrp="1"/>
+          </p:cNvSpPr>
+          <p:nvPr>
+            <p:ph type="sldNum" sz="quarter" idx="12"/>
+          </p:nvPr>
+        </p:nvSpPr>
+        <p:spPr/>
+        <p:txBody>
+          <a:bodyPr/>
+          <a:lstStyle/>
+          <a:p>
+            <a:fld id="{87DF2A7E-8477-AD4D-AAAC-6B3DEECADF48}" type="slidenum">
+              <a:rPr lang="de-DE" smtClean="0"/>
+              <a:t>4</a:t>
+            </a:fld>
+            <a:endParaRPr lang="de-DE"/>
+          </a:p>
+        </p:txBody>
+      </p:sp>
+      <p:sp>
+        <p:nvSpPr>
+          <p:cNvPr id="8" name="TextBox 7">
+            <a:extLst>
+              <a:ext uri="{FF2B5EF4-FFF2-40B4-BE49-F238E27FC236}">
+                <a16:creationId xmlns:a16="http://schemas.microsoft.com/office/drawing/2014/main" id="{B98DB151-BE42-984A-AF67-73FF9A96CF51}"/>
+              </a:ext>
+            </a:extLst>
+          </p:cNvPr>
+          <p:cNvSpPr txBox="1"/>
+          <p:nvPr/>
+        </p:nvSpPr>
+        <p:spPr>
+          <a:xfrm>
+            <a:off x="409591" y="849500"/>
+            <a:ext cx="7213953" cy="1477328"/>
+          </a:xfrm>
+          <a:prstGeom prst="rect">
+            <a:avLst/>
+          </a:prstGeom>
+          <a:noFill/>
+        </p:spPr>
+        <p:txBody>
+          <a:bodyPr wrap="square" rtlCol="0">
+            <a:spAutoFit/>
+          </a:bodyPr>
+          <a:lstStyle/>
+          <a:p>
+            <a:endParaRPr lang="en-US" dirty="0"/>
+          </a:p>
+          <a:p>
+            <a:pPr lvl="1"/>
+            <a:r>
+              <a:rPr lang="en-US" dirty="0"/>
+              <a:t>The simulator design is based on the MVC architecture, i.e., the algorithms are decoupled from the UI so any further algorithms can be implemented without changing the structure.</a:t>
+            </a:r>
+          </a:p>
+          <a:p>
+            <a:endParaRPr lang="en-US" dirty="0"/>
+          </a:p>
+        </p:txBody>
+      </p:sp>
+      <p:sp>
+        <p:nvSpPr>
+          <p:cNvPr id="9" name="TextBox 8">
+            <a:extLst>
+              <a:ext uri="{FF2B5EF4-FFF2-40B4-BE49-F238E27FC236}">
+                <a16:creationId xmlns:a16="http://schemas.microsoft.com/office/drawing/2014/main" id="{C44C9046-73CE-3C49-B595-E7045FF7F857}"/>
+              </a:ext>
+            </a:extLst>
+          </p:cNvPr>
+          <p:cNvSpPr txBox="1"/>
+          <p:nvPr/>
+        </p:nvSpPr>
+        <p:spPr>
+          <a:xfrm>
+            <a:off x="7240772" y="2062716"/>
+            <a:ext cx="4561368" cy="1200329"/>
+          </a:xfrm>
+          <a:prstGeom prst="rect">
+            <a:avLst/>
+          </a:prstGeom>
+          <a:noFill/>
+        </p:spPr>
+        <p:txBody>
+          <a:bodyPr wrap="square" rtlCol="0">
+            <a:spAutoFit/>
+          </a:bodyPr>
+          <a:lstStyle/>
+          <a:p>
+            <a:pPr marL="285750" indent="-285750">
+              <a:buFont typeface="Arial" panose="020B0604020202020204" pitchFamily="34" charset="0"/>
+              <a:buChar char="•"/>
+            </a:pPr>
+            <a:r>
+              <a:rPr lang="en-US" dirty="0"/>
+              <a:t>Model: Defines the algorithms</a:t>
+            </a:r>
+          </a:p>
+          <a:p>
+            <a:pPr marL="285750" indent="-285750">
+              <a:buFont typeface="Arial" panose="020B0604020202020204" pitchFamily="34" charset="0"/>
+              <a:buChar char="•"/>
+            </a:pPr>
+            <a:r>
+              <a:rPr lang="en-US" dirty="0"/>
+              <a:t>Views: Graphical representation</a:t>
+            </a:r>
+          </a:p>
+          <a:p>
+            <a:pPr marL="285750" indent="-285750">
+              <a:buFont typeface="Arial" panose="020B0604020202020204" pitchFamily="34" charset="0"/>
+              <a:buChar char="•"/>
+            </a:pPr>
+            <a:r>
+              <a:rPr lang="en-US" dirty="0"/>
+              <a:t>Controller: Redirects the request to the model </a:t>
+            </a:r>
+          </a:p>
+        </p:txBody>
+      </p:sp>
+    </p:spTree>
+    <p:extLst>
+      <p:ext uri="{BB962C8B-B14F-4D97-AF65-F5344CB8AC3E}">
+        <p14:creationId xmlns:p14="http://schemas.microsoft.com/office/powerpoint/2010/main" val="1713713305"/>
+      </p:ext>
+    </p:extLst>
+  </p:cSld>
+  <p:clrMapOvr>
+    <a:masterClrMapping/>
+  </p:clrMapOvr>
+</p:sld>
+</file>
+
+<file path=ppt/slides/slide5.xml><?xml version="1.0" encoding="utf-8"?>
+<p:sld xmlns:a="http://schemas.openxmlformats.org/drawingml/2006/main" xmlns:r="http://schemas.openxmlformats.org/officeDocument/2006/relationships" xmlns:p="http://schemas.openxmlformats.org/presentationml/2006/main">
+  <p:cSld>
+    <p:spTree>
+      <p:nvGrpSpPr>
+        <p:cNvPr id="1" name=""/>
+        <p:cNvGrpSpPr/>
+        <p:nvPr/>
+      </p:nvGrpSpPr>
+      <p:grpSpPr>
+        <a:xfrm>
+          <a:off x="0" y="0"/>
+          <a:ext cx="0" cy="0"/>
+          <a:chOff x="0" y="0"/>
+          <a:chExt cx="0" cy="0"/>
+        </a:xfrm>
+      </p:grpSpPr>
+      <p:sp>
+        <p:nvSpPr>
+          <p:cNvPr id="2" name="Title 1">
+            <a:extLst>
+              <a:ext uri="{FF2B5EF4-FFF2-40B4-BE49-F238E27FC236}">
                 <a16:creationId xmlns:a16="http://schemas.microsoft.com/office/drawing/2014/main" id="{D4858DAF-249F-5148-9CF1-E8D24A5F7E28}"/>
               </a:ext>
             </a:extLst>
@@ -4055,7 +4295,7 @@
           <a:p>
             <a:fld id="{87DF2A7E-8477-AD4D-AAAC-6B3DEECADF48}" type="slidenum">
               <a:rPr lang="de-DE" smtClean="0"/>
-              <a:t>4</a:t>
+              <a:t>5</a:t>
             </a:fld>
             <a:endParaRPr lang="de-DE"/>
           </a:p>
@@ -4110,7 +4350,7 @@
 </p:sld>
 </file>
 
-<file path=ppt/slides/slide5.xml><?xml version="1.0" encoding="utf-8"?>
+<file path=ppt/slides/slide6.xml><?xml version="1.0" encoding="utf-8"?>
 <p:sld xmlns:a="http://schemas.openxmlformats.org/drawingml/2006/main" xmlns:r="http://schemas.openxmlformats.org/officeDocument/2006/relationships" xmlns:p="http://schemas.openxmlformats.org/presentationml/2006/main">
   <p:cSld>
     <p:spTree>
@@ -4204,7 +4444,7 @@
           <a:p>
             <a:fld id="{87DF2A7E-8477-AD4D-AAAC-6B3DEECADF48}" type="slidenum">
               <a:rPr lang="de-DE" smtClean="0"/>
-              <a:t>5</a:t>
+              <a:t>6</a:t>
             </a:fld>
             <a:endParaRPr lang="de-DE"/>
           </a:p>
@@ -4259,7 +4499,7 @@
 </p:sld>
 </file>
 
-<file path=ppt/slides/slide6.xml><?xml version="1.0" encoding="utf-8"?>
+<file path=ppt/slides/slide7.xml><?xml version="1.0" encoding="utf-8"?>
 <p:sld xmlns:a="http://schemas.openxmlformats.org/drawingml/2006/main" xmlns:r="http://schemas.openxmlformats.org/officeDocument/2006/relationships" xmlns:p="http://schemas.openxmlformats.org/presentationml/2006/main">
   <p:cSld>
     <p:spTree>
@@ -4385,7 +4625,7 @@
           <a:p>
             <a:fld id="{87DF2A7E-8477-AD4D-AAAC-6B3DEECADF48}" type="slidenum">
               <a:rPr lang="de-DE" smtClean="0"/>
-              <a:t>6</a:t>
+              <a:t>7</a:t>
             </a:fld>
             <a:endParaRPr lang="de-DE"/>
           </a:p>

</xml_diff>